<commit_message>
Update cshl 2025 full lecture slides
</commit_message>
<xml_diff>
--- a/assets/lectures/cshl/2025/RNAseq_2025_Template_Widescreen_CSHL_update.pptx
+++ b/assets/lectures/cshl/2025/RNAseq_2025_Template_Widescreen_CSHL_update.pptx
@@ -199,7 +199,7 @@
           <a:p>
             <a:fld id="{827BD9F9-8452-A342-BB1B-28ECF19E2CC5}" type="datetimeFigureOut">
               <a:rPr lang="en-US" smtClean="0"/>
-              <a:t>11/11/25</a:t>
+              <a:t>11/14/25</a:t>
             </a:fld>
             <a:endParaRPr lang="en-US"/>
           </a:p>
@@ -937,14 +937,14 @@
           </a:ln>
           <a:extLst>
             <a:ext uri="{909E8E84-426E-40dd-AFC4-6F175D3DCCD1}">
-              <a14:hiddenFill xmlns:a14="http://schemas.microsoft.com/office/drawing/2010/main" xmlns="">
+              <a14:hiddenFill xmlns="" xmlns:a14="http://schemas.microsoft.com/office/drawing/2010/main">
                 <a:solidFill>
                   <a:srgbClr val="FFFFFF"/>
                 </a:solidFill>
               </a14:hiddenFill>
             </a:ext>
             <a:ext uri="{91240B29-F687-4f45-9708-019B960494DF}">
-              <a14:hiddenLine xmlns:a14="http://schemas.microsoft.com/office/drawing/2010/main" xmlns="" w="9525">
+              <a14:hiddenLine xmlns="" xmlns:a14="http://schemas.microsoft.com/office/drawing/2010/main" w="9525">
                 <a:solidFill>
                   <a:srgbClr val="000000"/>
                 </a:solidFill>
@@ -1082,14 +1082,14 @@
           </a:ln>
           <a:extLst>
             <a:ext uri="{909E8E84-426E-40dd-AFC4-6F175D3DCCD1}">
-              <a14:hiddenFill xmlns:a14="http://schemas.microsoft.com/office/drawing/2010/main" xmlns="">
+              <a14:hiddenFill xmlns="" xmlns:a14="http://schemas.microsoft.com/office/drawing/2010/main">
                 <a:solidFill>
                   <a:srgbClr val="FFFFFF"/>
                 </a:solidFill>
               </a14:hiddenFill>
             </a:ext>
             <a:ext uri="{91240B29-F687-4f45-9708-019B960494DF}">
-              <a14:hiddenLine xmlns:a14="http://schemas.microsoft.com/office/drawing/2010/main" xmlns="" w="9525">
+              <a14:hiddenLine xmlns="" xmlns:a14="http://schemas.microsoft.com/office/drawing/2010/main" w="9525">
                 <a:solidFill>
                   <a:srgbClr val="000000"/>
                 </a:solidFill>
@@ -3326,14 +3326,14 @@
           </a:ln>
           <a:extLst>
             <a:ext uri="{909E8E84-426E-40dd-AFC4-6F175D3DCCD1}">
-              <a14:hiddenFill xmlns:a14="http://schemas.microsoft.com/office/drawing/2010/main" xmlns="">
+              <a14:hiddenFill xmlns="" xmlns:a14="http://schemas.microsoft.com/office/drawing/2010/main">
                 <a:solidFill>
                   <a:srgbClr val="FFFFFF"/>
                 </a:solidFill>
               </a14:hiddenFill>
             </a:ext>
             <a:ext uri="{91240B29-F687-4f45-9708-019B960494DF}">
-              <a14:hiddenLine xmlns:a14="http://schemas.microsoft.com/office/drawing/2010/main" xmlns="" w="9525">
+              <a14:hiddenLine xmlns="" xmlns:a14="http://schemas.microsoft.com/office/drawing/2010/main" w="9525">
                 <a:solidFill>
                   <a:srgbClr val="000000"/>
                 </a:solidFill>
@@ -3517,14 +3517,14 @@
           </a:ln>
           <a:extLst>
             <a:ext uri="{909E8E84-426E-40dd-AFC4-6F175D3DCCD1}">
-              <a14:hiddenFill xmlns="" xmlns:a14="http://schemas.microsoft.com/office/drawing/2010/main">
+              <a14:hiddenFill xmlns:a14="http://schemas.microsoft.com/office/drawing/2010/main" xmlns="">
                 <a:solidFill>
                   <a:srgbClr val="FFFFFF"/>
                 </a:solidFill>
               </a14:hiddenFill>
             </a:ext>
             <a:ext uri="{91240B29-F687-4f45-9708-019B960494DF}">
-              <a14:hiddenLine xmlns="" xmlns:a14="http://schemas.microsoft.com/office/drawing/2010/main" w="9525">
+              <a14:hiddenLine xmlns:a14="http://schemas.microsoft.com/office/drawing/2010/main" xmlns="" w="9525">
                 <a:solidFill>
                   <a:srgbClr val="000000"/>
                 </a:solidFill>

</xml_diff>